<commit_message>
exp 10 11 12
</commit_message>
<xml_diff>
--- a/presentations_proposals/20201101_summary_ppt.pptx
+++ b/presentations_proposals/20201101_summary_ppt.pptx
@@ -5,7 +5,7 @@
     <p:sldMasterId id="2147483648" r:id="rId1"/>
   </p:sldMasterIdLst>
   <p:notesMasterIdLst>
-    <p:notesMasterId r:id="rId16"/>
+    <p:notesMasterId r:id="rId20"/>
   </p:notesMasterIdLst>
   <p:sldIdLst>
     <p:sldId id="256" r:id="rId2"/>
@@ -22,6 +22,10 @@
     <p:sldId id="352" r:id="rId13"/>
     <p:sldId id="357" r:id="rId14"/>
     <p:sldId id="358" r:id="rId15"/>
+    <p:sldId id="361" r:id="rId16"/>
+    <p:sldId id="362" r:id="rId17"/>
+    <p:sldId id="359" r:id="rId18"/>
+    <p:sldId id="360" r:id="rId19"/>
   </p:sldIdLst>
   <p:sldSz cx="12192000" cy="6858000"/>
   <p:notesSz cx="6858000" cy="9144000"/>
@@ -210,7 +214,7 @@
           <a:p>
             <a:fld id="{E59AB5F3-042F-9C41-8735-1D6D416E90A8}" type="datetimeFigureOut">
               <a:rPr lang="en-US" smtClean="0"/>
-              <a:t>11/2/20</a:t>
+              <a:t>11/4/20</a:t>
             </a:fld>
             <a:endParaRPr lang="en-US"/>
           </a:p>
@@ -1213,7 +1217,7 @@
           <a:p>
             <a:fld id="{3B3400CD-7287-EA41-97B8-6C373A830532}" type="datetimeFigureOut">
               <a:rPr lang="en-US" smtClean="0"/>
-              <a:t>11/2/20</a:t>
+              <a:t>11/4/20</a:t>
             </a:fld>
             <a:endParaRPr lang="en-US"/>
           </a:p>
@@ -1411,7 +1415,7 @@
           <a:p>
             <a:fld id="{3B3400CD-7287-EA41-97B8-6C373A830532}" type="datetimeFigureOut">
               <a:rPr lang="en-US" smtClean="0"/>
-              <a:t>11/2/20</a:t>
+              <a:t>11/4/20</a:t>
             </a:fld>
             <a:endParaRPr lang="en-US"/>
           </a:p>
@@ -1619,7 +1623,7 @@
           <a:p>
             <a:fld id="{3B3400CD-7287-EA41-97B8-6C373A830532}" type="datetimeFigureOut">
               <a:rPr lang="en-US" smtClean="0"/>
-              <a:t>11/2/20</a:t>
+              <a:t>11/4/20</a:t>
             </a:fld>
             <a:endParaRPr lang="en-US"/>
           </a:p>
@@ -1825,7 +1829,7 @@
           <a:p>
             <a:fld id="{3B3400CD-7287-EA41-97B8-6C373A830532}" type="datetimeFigureOut">
               <a:rPr lang="en-US" smtClean="0"/>
-              <a:t>11/2/20</a:t>
+              <a:t>11/4/20</a:t>
             </a:fld>
             <a:endParaRPr lang="en-US"/>
           </a:p>
@@ -2100,7 +2104,7 @@
           <a:p>
             <a:fld id="{3B3400CD-7287-EA41-97B8-6C373A830532}" type="datetimeFigureOut">
               <a:rPr lang="en-US" smtClean="0"/>
-              <a:t>11/2/20</a:t>
+              <a:t>11/4/20</a:t>
             </a:fld>
             <a:endParaRPr lang="en-US"/>
           </a:p>
@@ -2365,7 +2369,7 @@
           <a:p>
             <a:fld id="{3B3400CD-7287-EA41-97B8-6C373A830532}" type="datetimeFigureOut">
               <a:rPr lang="en-US" smtClean="0"/>
-              <a:t>11/2/20</a:t>
+              <a:t>11/4/20</a:t>
             </a:fld>
             <a:endParaRPr lang="en-US"/>
           </a:p>
@@ -2777,7 +2781,7 @@
           <a:p>
             <a:fld id="{3B3400CD-7287-EA41-97B8-6C373A830532}" type="datetimeFigureOut">
               <a:rPr lang="en-US" smtClean="0"/>
-              <a:t>11/2/20</a:t>
+              <a:t>11/4/20</a:t>
             </a:fld>
             <a:endParaRPr lang="en-US"/>
           </a:p>
@@ -2918,7 +2922,7 @@
           <a:p>
             <a:fld id="{3B3400CD-7287-EA41-97B8-6C373A830532}" type="datetimeFigureOut">
               <a:rPr lang="en-US" smtClean="0"/>
-              <a:t>11/2/20</a:t>
+              <a:t>11/4/20</a:t>
             </a:fld>
             <a:endParaRPr lang="en-US"/>
           </a:p>
@@ -3031,7 +3035,7 @@
           <a:p>
             <a:fld id="{3B3400CD-7287-EA41-97B8-6C373A830532}" type="datetimeFigureOut">
               <a:rPr lang="en-US" smtClean="0"/>
-              <a:t>11/2/20</a:t>
+              <a:t>11/4/20</a:t>
             </a:fld>
             <a:endParaRPr lang="en-US"/>
           </a:p>
@@ -3342,7 +3346,7 @@
           <a:p>
             <a:fld id="{3B3400CD-7287-EA41-97B8-6C373A830532}" type="datetimeFigureOut">
               <a:rPr lang="en-US" smtClean="0"/>
-              <a:t>11/2/20</a:t>
+              <a:t>11/4/20</a:t>
             </a:fld>
             <a:endParaRPr lang="en-US"/>
           </a:p>
@@ -3633,7 +3637,7 @@
           <a:p>
             <a:fld id="{3B3400CD-7287-EA41-97B8-6C373A830532}" type="datetimeFigureOut">
               <a:rPr lang="en-US" smtClean="0"/>
-              <a:t>11/2/20</a:t>
+              <a:t>11/4/20</a:t>
             </a:fld>
             <a:endParaRPr lang="en-US"/>
           </a:p>
@@ -3876,7 +3880,7 @@
             <a:fld id="{3B3400CD-7287-EA41-97B8-6C373A830532}" type="datetimeFigureOut">
               <a:rPr lang="en-US" smtClean="0"/>
               <a:pPr/>
-              <a:t>11/2/20</a:t>
+              <a:t>11/4/20</a:t>
             </a:fld>
             <a:endParaRPr lang="en-US" dirty="0"/>
           </a:p>
@@ -4857,6 +4861,313 @@
     <p:extLst>
       <p:ext uri="{BB962C8B-B14F-4D97-AF65-F5344CB8AC3E}">
         <p14:creationId xmlns:p14="http://schemas.microsoft.com/office/powerpoint/2010/main" val="762026286"/>
+      </p:ext>
+    </p:extLst>
+  </p:cSld>
+  <p:clrMapOvr>
+    <a:masterClrMapping/>
+  </p:clrMapOvr>
+</p:sld>
+</file>
+
+<file path=ppt/slides/slide15.xml><?xml version="1.0" encoding="utf-8"?>
+<p:sld xmlns:a="http://schemas.openxmlformats.org/drawingml/2006/main" xmlns:r="http://schemas.openxmlformats.org/officeDocument/2006/relationships" xmlns:p="http://schemas.openxmlformats.org/presentationml/2006/main">
+  <p:cSld>
+    <p:spTree>
+      <p:nvGrpSpPr>
+        <p:cNvPr id="1" name=""/>
+        <p:cNvGrpSpPr/>
+        <p:nvPr/>
+      </p:nvGrpSpPr>
+      <p:grpSpPr>
+        <a:xfrm>
+          <a:off x="0" y="0"/>
+          <a:ext cx="0" cy="0"/>
+          <a:chOff x="0" y="0"/>
+          <a:chExt cx="0" cy="0"/>
+        </a:xfrm>
+      </p:grpSpPr>
+      <p:sp>
+        <p:nvSpPr>
+          <p:cNvPr id="2" name="Title 1">
+            <a:extLst>
+              <a:ext uri="{FF2B5EF4-FFF2-40B4-BE49-F238E27FC236}">
+                <a16:creationId xmlns:a16="http://schemas.microsoft.com/office/drawing/2014/main" id="{51B4514C-CFDB-1A45-85B8-19F403C3EE26}"/>
+              </a:ext>
+            </a:extLst>
+          </p:cNvPr>
+          <p:cNvSpPr>
+            <a:spLocks noGrp="1"/>
+          </p:cNvSpPr>
+          <p:nvPr>
+            <p:ph type="title"/>
+          </p:nvPr>
+        </p:nvSpPr>
+        <p:spPr/>
+        <p:txBody>
+          <a:bodyPr/>
+          <a:lstStyle/>
+          <a:p>
+            <a:r>
+              <a:rPr lang="en-US" dirty="0"/>
+              <a:t>Exp 10: ATP Control Round 2</a:t>
+            </a:r>
+          </a:p>
+        </p:txBody>
+      </p:sp>
+      <p:sp>
+        <p:nvSpPr>
+          <p:cNvPr id="3" name="Text Placeholder 2">
+            <a:extLst>
+              <a:ext uri="{FF2B5EF4-FFF2-40B4-BE49-F238E27FC236}">
+                <a16:creationId xmlns:a16="http://schemas.microsoft.com/office/drawing/2014/main" id="{F419DEFD-7FD0-7241-93D7-9FCE51871216}"/>
+              </a:ext>
+            </a:extLst>
+          </p:cNvPr>
+          <p:cNvSpPr>
+            <a:spLocks noGrp="1"/>
+          </p:cNvSpPr>
+          <p:nvPr>
+            <p:ph type="body" idx="1"/>
+          </p:nvPr>
+        </p:nvSpPr>
+        <p:spPr/>
+        <p:txBody>
+          <a:bodyPr/>
+          <a:lstStyle/>
+          <a:p>
+            <a:r>
+              <a:rPr lang="en-US" dirty="0"/>
+              <a:t>Done with luminescence this time!</a:t>
+            </a:r>
+          </a:p>
+          <a:p>
+            <a:r>
+              <a:rPr lang="en-US" dirty="0"/>
+              <a:t>20201103_exp10_controls_atp</a:t>
+            </a:r>
+          </a:p>
+        </p:txBody>
+      </p:sp>
+    </p:spTree>
+    <p:extLst>
+      <p:ext uri="{BB962C8B-B14F-4D97-AF65-F5344CB8AC3E}">
+        <p14:creationId xmlns:p14="http://schemas.microsoft.com/office/powerpoint/2010/main" val="955133763"/>
+      </p:ext>
+    </p:extLst>
+  </p:cSld>
+  <p:clrMapOvr>
+    <a:masterClrMapping/>
+  </p:clrMapOvr>
+</p:sld>
+</file>
+
+<file path=ppt/slides/slide16.xml><?xml version="1.0" encoding="utf-8"?>
+<p:sld xmlns:a="http://schemas.openxmlformats.org/drawingml/2006/main" xmlns:r="http://schemas.openxmlformats.org/officeDocument/2006/relationships" xmlns:p="http://schemas.openxmlformats.org/presentationml/2006/main">
+  <p:cSld>
+    <p:spTree>
+      <p:nvGrpSpPr>
+        <p:cNvPr id="1" name=""/>
+        <p:cNvGrpSpPr/>
+        <p:nvPr/>
+      </p:nvGrpSpPr>
+      <p:grpSpPr>
+        <a:xfrm>
+          <a:off x="0" y="0"/>
+          <a:ext cx="0" cy="0"/>
+          <a:chOff x="0" y="0"/>
+          <a:chExt cx="0" cy="0"/>
+        </a:xfrm>
+      </p:grpSpPr>
+    </p:spTree>
+    <p:extLst>
+      <p:ext uri="{BB962C8B-B14F-4D97-AF65-F5344CB8AC3E}">
+        <p14:creationId xmlns:p14="http://schemas.microsoft.com/office/powerpoint/2010/main" val="1318330343"/>
+      </p:ext>
+    </p:extLst>
+  </p:cSld>
+  <p:clrMapOvr>
+    <a:masterClrMapping/>
+  </p:clrMapOvr>
+</p:sld>
+</file>
+
+<file path=ppt/slides/slide17.xml><?xml version="1.0" encoding="utf-8"?>
+<p:sld xmlns:a="http://schemas.openxmlformats.org/drawingml/2006/main" xmlns:r="http://schemas.openxmlformats.org/officeDocument/2006/relationships" xmlns:p="http://schemas.openxmlformats.org/presentationml/2006/main">
+  <p:cSld>
+    <p:spTree>
+      <p:nvGrpSpPr>
+        <p:cNvPr id="1" name=""/>
+        <p:cNvGrpSpPr/>
+        <p:nvPr/>
+      </p:nvGrpSpPr>
+      <p:grpSpPr>
+        <a:xfrm>
+          <a:off x="0" y="0"/>
+          <a:ext cx="0" cy="0"/>
+          <a:chOff x="0" y="0"/>
+          <a:chExt cx="0" cy="0"/>
+        </a:xfrm>
+      </p:grpSpPr>
+      <p:sp>
+        <p:nvSpPr>
+          <p:cNvPr id="2" name="Title 1">
+            <a:extLst>
+              <a:ext uri="{FF2B5EF4-FFF2-40B4-BE49-F238E27FC236}">
+                <a16:creationId xmlns:a16="http://schemas.microsoft.com/office/drawing/2014/main" id="{48A7928A-0827-6C4F-BCD5-2DC016A09565}"/>
+              </a:ext>
+            </a:extLst>
+          </p:cNvPr>
+          <p:cNvSpPr>
+            <a:spLocks noGrp="1"/>
+          </p:cNvSpPr>
+          <p:nvPr>
+            <p:ph type="title"/>
+          </p:nvPr>
+        </p:nvSpPr>
+        <p:spPr/>
+        <p:txBody>
+          <a:bodyPr/>
+          <a:lstStyle/>
+          <a:p>
+            <a:r>
+              <a:rPr lang="en-US" dirty="0"/>
+              <a:t>Exp 11: ATP in Beginning</a:t>
+            </a:r>
+          </a:p>
+        </p:txBody>
+      </p:sp>
+      <p:sp>
+        <p:nvSpPr>
+          <p:cNvPr id="3" name="Text Placeholder 2">
+            <a:extLst>
+              <a:ext uri="{FF2B5EF4-FFF2-40B4-BE49-F238E27FC236}">
+                <a16:creationId xmlns:a16="http://schemas.microsoft.com/office/drawing/2014/main" id="{18766857-3634-E045-8459-56C4BA31F075}"/>
+              </a:ext>
+            </a:extLst>
+          </p:cNvPr>
+          <p:cNvSpPr>
+            <a:spLocks noGrp="1"/>
+          </p:cNvSpPr>
+          <p:nvPr>
+            <p:ph type="body" idx="1"/>
+          </p:nvPr>
+        </p:nvSpPr>
+        <p:spPr/>
+        <p:txBody>
+          <a:bodyPr/>
+          <a:lstStyle/>
+          <a:p>
+            <a:r>
+              <a:rPr lang="en-US" dirty="0"/>
+              <a:t>20201103_exp11_gfp_atpinbeg_timeseries</a:t>
+            </a:r>
+          </a:p>
+        </p:txBody>
+      </p:sp>
+    </p:spTree>
+    <p:extLst>
+      <p:ext uri="{BB962C8B-B14F-4D97-AF65-F5344CB8AC3E}">
+        <p14:creationId xmlns:p14="http://schemas.microsoft.com/office/powerpoint/2010/main" val="3540394520"/>
+      </p:ext>
+    </p:extLst>
+  </p:cSld>
+  <p:clrMapOvr>
+    <a:masterClrMapping/>
+  </p:clrMapOvr>
+</p:sld>
+</file>
+
+<file path=ppt/slides/slide18.xml><?xml version="1.0" encoding="utf-8"?>
+<p:sld xmlns:a="http://schemas.openxmlformats.org/drawingml/2006/main" xmlns:r="http://schemas.openxmlformats.org/officeDocument/2006/relationships" xmlns:p="http://schemas.openxmlformats.org/presentationml/2006/main">
+  <p:cSld>
+    <p:spTree>
+      <p:nvGrpSpPr>
+        <p:cNvPr id="1" name=""/>
+        <p:cNvGrpSpPr/>
+        <p:nvPr/>
+      </p:nvGrpSpPr>
+      <p:grpSpPr>
+        <a:xfrm>
+          <a:off x="0" y="0"/>
+          <a:ext cx="0" cy="0"/>
+          <a:chOff x="0" y="0"/>
+          <a:chExt cx="0" cy="0"/>
+        </a:xfrm>
+      </p:grpSpPr>
+      <p:pic>
+        <p:nvPicPr>
+          <p:cNvPr id="3" name="Picture 2" descr="Chart&#10;&#10;Description automatically generated">
+            <a:extLst>
+              <a:ext uri="{FF2B5EF4-FFF2-40B4-BE49-F238E27FC236}">
+                <a16:creationId xmlns:a16="http://schemas.microsoft.com/office/drawing/2014/main" id="{53859399-F444-434A-98B5-CD0D843E952A}"/>
+              </a:ext>
+            </a:extLst>
+          </p:cNvPr>
+          <p:cNvPicPr>
+            <a:picLocks noChangeAspect="1"/>
+          </p:cNvPicPr>
+          <p:nvPr/>
+        </p:nvPicPr>
+        <p:blipFill>
+          <a:blip r:embed="rId2"/>
+          <a:stretch>
+            <a:fillRect/>
+          </a:stretch>
+        </p:blipFill>
+        <p:spPr>
+          <a:xfrm>
+            <a:off x="1039586" y="800099"/>
+            <a:ext cx="9887494" cy="5324035"/>
+          </a:xfrm>
+          <a:prstGeom prst="rect">
+            <a:avLst/>
+          </a:prstGeom>
+        </p:spPr>
+      </p:pic>
+      <p:sp>
+        <p:nvSpPr>
+          <p:cNvPr id="4" name="TextBox 3">
+            <a:extLst>
+              <a:ext uri="{FF2B5EF4-FFF2-40B4-BE49-F238E27FC236}">
+                <a16:creationId xmlns:a16="http://schemas.microsoft.com/office/drawing/2014/main" id="{AA84E416-C048-C147-9366-3306A900C9D2}"/>
+              </a:ext>
+            </a:extLst>
+          </p:cNvPr>
+          <p:cNvSpPr txBox="1"/>
+          <p:nvPr/>
+        </p:nvSpPr>
+        <p:spPr>
+          <a:xfrm>
+            <a:off x="388619" y="364534"/>
+            <a:ext cx="5983152" cy="369332"/>
+          </a:xfrm>
+          <a:prstGeom prst="rect">
+            <a:avLst/>
+          </a:prstGeom>
+          <a:noFill/>
+        </p:spPr>
+        <p:txBody>
+          <a:bodyPr wrap="square" rtlCol="0">
+            <a:spAutoFit/>
+          </a:bodyPr>
+          <a:lstStyle/>
+          <a:p>
+            <a:r>
+              <a:rPr lang="en-US" dirty="0">
+                <a:solidFill>
+                  <a:srgbClr val="FF0000"/>
+                </a:solidFill>
+              </a:rPr>
+              <a:t>This is bad data because volume was not consistent</a:t>
+            </a:r>
+          </a:p>
+        </p:txBody>
+      </p:sp>
+    </p:spTree>
+    <p:extLst>
+      <p:ext uri="{BB962C8B-B14F-4D97-AF65-F5344CB8AC3E}">
+        <p14:creationId xmlns:p14="http://schemas.microsoft.com/office/powerpoint/2010/main" val="960817816"/>
       </p:ext>
     </p:extLst>
   </p:cSld>

</xml_diff>

<commit_message>
adding weeks experiments and analyses
</commit_message>
<xml_diff>
--- a/presentations_proposals/20201101_summary_ppt.pptx
+++ b/presentations_proposals/20201101_summary_ppt.pptx
@@ -5,7 +5,7 @@
     <p:sldMasterId id="2147483648" r:id="rId1"/>
   </p:sldMasterIdLst>
   <p:notesMasterIdLst>
-    <p:notesMasterId r:id="rId20"/>
+    <p:notesMasterId r:id="rId26"/>
   </p:notesMasterIdLst>
   <p:sldIdLst>
     <p:sldId id="256" r:id="rId2"/>
@@ -26,6 +26,12 @@
     <p:sldId id="362" r:id="rId17"/>
     <p:sldId id="359" r:id="rId18"/>
     <p:sldId id="360" r:id="rId19"/>
+    <p:sldId id="363" r:id="rId20"/>
+    <p:sldId id="364" r:id="rId21"/>
+    <p:sldId id="368" r:id="rId22"/>
+    <p:sldId id="365" r:id="rId23"/>
+    <p:sldId id="366" r:id="rId24"/>
+    <p:sldId id="367" r:id="rId25"/>
   </p:sldIdLst>
   <p:sldSz cx="12192000" cy="6858000"/>
   <p:notesSz cx="6858000" cy="9144000"/>
@@ -214,7 +220,7 @@
           <a:p>
             <a:fld id="{E59AB5F3-042F-9C41-8735-1D6D416E90A8}" type="datetimeFigureOut">
               <a:rPr lang="en-US" smtClean="0"/>
-              <a:t>11/4/20</a:t>
+              <a:t>11/7/20</a:t>
             </a:fld>
             <a:endParaRPr lang="en-US"/>
           </a:p>
@@ -1217,7 +1223,7 @@
           <a:p>
             <a:fld id="{3B3400CD-7287-EA41-97B8-6C373A830532}" type="datetimeFigureOut">
               <a:rPr lang="en-US" smtClean="0"/>
-              <a:t>11/4/20</a:t>
+              <a:t>11/7/20</a:t>
             </a:fld>
             <a:endParaRPr lang="en-US"/>
           </a:p>
@@ -1415,7 +1421,7 @@
           <a:p>
             <a:fld id="{3B3400CD-7287-EA41-97B8-6C373A830532}" type="datetimeFigureOut">
               <a:rPr lang="en-US" smtClean="0"/>
-              <a:t>11/4/20</a:t>
+              <a:t>11/7/20</a:t>
             </a:fld>
             <a:endParaRPr lang="en-US"/>
           </a:p>
@@ -1623,7 +1629,7 @@
           <a:p>
             <a:fld id="{3B3400CD-7287-EA41-97B8-6C373A830532}" type="datetimeFigureOut">
               <a:rPr lang="en-US" smtClean="0"/>
-              <a:t>11/4/20</a:t>
+              <a:t>11/7/20</a:t>
             </a:fld>
             <a:endParaRPr lang="en-US"/>
           </a:p>
@@ -1829,7 +1835,7 @@
           <a:p>
             <a:fld id="{3B3400CD-7287-EA41-97B8-6C373A830532}" type="datetimeFigureOut">
               <a:rPr lang="en-US" smtClean="0"/>
-              <a:t>11/4/20</a:t>
+              <a:t>11/7/20</a:t>
             </a:fld>
             <a:endParaRPr lang="en-US"/>
           </a:p>
@@ -2104,7 +2110,7 @@
           <a:p>
             <a:fld id="{3B3400CD-7287-EA41-97B8-6C373A830532}" type="datetimeFigureOut">
               <a:rPr lang="en-US" smtClean="0"/>
-              <a:t>11/4/20</a:t>
+              <a:t>11/7/20</a:t>
             </a:fld>
             <a:endParaRPr lang="en-US"/>
           </a:p>
@@ -2369,7 +2375,7 @@
           <a:p>
             <a:fld id="{3B3400CD-7287-EA41-97B8-6C373A830532}" type="datetimeFigureOut">
               <a:rPr lang="en-US" smtClean="0"/>
-              <a:t>11/4/20</a:t>
+              <a:t>11/7/20</a:t>
             </a:fld>
             <a:endParaRPr lang="en-US"/>
           </a:p>
@@ -2781,7 +2787,7 @@
           <a:p>
             <a:fld id="{3B3400CD-7287-EA41-97B8-6C373A830532}" type="datetimeFigureOut">
               <a:rPr lang="en-US" smtClean="0"/>
-              <a:t>11/4/20</a:t>
+              <a:t>11/7/20</a:t>
             </a:fld>
             <a:endParaRPr lang="en-US"/>
           </a:p>
@@ -2922,7 +2928,7 @@
           <a:p>
             <a:fld id="{3B3400CD-7287-EA41-97B8-6C373A830532}" type="datetimeFigureOut">
               <a:rPr lang="en-US" smtClean="0"/>
-              <a:t>11/4/20</a:t>
+              <a:t>11/7/20</a:t>
             </a:fld>
             <a:endParaRPr lang="en-US"/>
           </a:p>
@@ -3035,7 +3041,7 @@
           <a:p>
             <a:fld id="{3B3400CD-7287-EA41-97B8-6C373A830532}" type="datetimeFigureOut">
               <a:rPr lang="en-US" smtClean="0"/>
-              <a:t>11/4/20</a:t>
+              <a:t>11/7/20</a:t>
             </a:fld>
             <a:endParaRPr lang="en-US"/>
           </a:p>
@@ -3346,7 +3352,7 @@
           <a:p>
             <a:fld id="{3B3400CD-7287-EA41-97B8-6C373A830532}" type="datetimeFigureOut">
               <a:rPr lang="en-US" smtClean="0"/>
-              <a:t>11/4/20</a:t>
+              <a:t>11/7/20</a:t>
             </a:fld>
             <a:endParaRPr lang="en-US"/>
           </a:p>
@@ -3637,7 +3643,7 @@
           <a:p>
             <a:fld id="{3B3400CD-7287-EA41-97B8-6C373A830532}" type="datetimeFigureOut">
               <a:rPr lang="en-US" smtClean="0"/>
-              <a:t>11/4/20</a:t>
+              <a:t>11/7/20</a:t>
             </a:fld>
             <a:endParaRPr lang="en-US"/>
           </a:p>
@@ -3880,7 +3886,7 @@
             <a:fld id="{3B3400CD-7287-EA41-97B8-6C373A830532}" type="datetimeFigureOut">
               <a:rPr lang="en-US" smtClean="0"/>
               <a:pPr/>
-              <a:t>11/4/20</a:t>
+              <a:t>11/7/20</a:t>
             </a:fld>
             <a:endParaRPr lang="en-US" dirty="0"/>
           </a:p>
@@ -5177,6 +5183,92 @@
 </p:sld>
 </file>
 
+<file path=ppt/slides/slide19.xml><?xml version="1.0" encoding="utf-8"?>
+<p:sld xmlns:a="http://schemas.openxmlformats.org/drawingml/2006/main" xmlns:r="http://schemas.openxmlformats.org/officeDocument/2006/relationships" xmlns:p="http://schemas.openxmlformats.org/presentationml/2006/main">
+  <p:cSld>
+    <p:spTree>
+      <p:nvGrpSpPr>
+        <p:cNvPr id="1" name=""/>
+        <p:cNvGrpSpPr/>
+        <p:nvPr/>
+      </p:nvGrpSpPr>
+      <p:grpSpPr>
+        <a:xfrm>
+          <a:off x="0" y="0"/>
+          <a:ext cx="0" cy="0"/>
+          <a:chOff x="0" y="0"/>
+          <a:chExt cx="0" cy="0"/>
+        </a:xfrm>
+      </p:grpSpPr>
+      <p:sp>
+        <p:nvSpPr>
+          <p:cNvPr id="2" name="Title 1">
+            <a:extLst>
+              <a:ext uri="{FF2B5EF4-FFF2-40B4-BE49-F238E27FC236}">
+                <a16:creationId xmlns:a16="http://schemas.microsoft.com/office/drawing/2014/main" id="{4DD51ADC-55E3-B749-BF89-CBDB0C1AA0F5}"/>
+              </a:ext>
+            </a:extLst>
+          </p:cNvPr>
+          <p:cNvSpPr>
+            <a:spLocks noGrp="1"/>
+          </p:cNvSpPr>
+          <p:nvPr>
+            <p:ph type="title"/>
+          </p:nvPr>
+        </p:nvSpPr>
+        <p:spPr/>
+        <p:txBody>
+          <a:bodyPr/>
+          <a:lstStyle/>
+          <a:p>
+            <a:r>
+              <a:rPr lang="en-US" dirty="0"/>
+              <a:t>Exp 12: Reagents in Beginning</a:t>
+            </a:r>
+          </a:p>
+        </p:txBody>
+      </p:sp>
+      <p:sp>
+        <p:nvSpPr>
+          <p:cNvPr id="3" name="Text Placeholder 2">
+            <a:extLst>
+              <a:ext uri="{FF2B5EF4-FFF2-40B4-BE49-F238E27FC236}">
+                <a16:creationId xmlns:a16="http://schemas.microsoft.com/office/drawing/2014/main" id="{1DA17A43-437E-944A-B474-CB9D49C85DD4}"/>
+              </a:ext>
+            </a:extLst>
+          </p:cNvPr>
+          <p:cNvSpPr>
+            <a:spLocks noGrp="1"/>
+          </p:cNvSpPr>
+          <p:nvPr>
+            <p:ph type="body" idx="1"/>
+          </p:nvPr>
+        </p:nvSpPr>
+        <p:spPr/>
+        <p:txBody>
+          <a:bodyPr/>
+          <a:lstStyle/>
+          <a:p>
+            <a:r>
+              <a:rPr lang="en-US" dirty="0"/>
+              <a:t>20201104_exp12_gfp_moreinbeg_timeseries</a:t>
+            </a:r>
+          </a:p>
+        </p:txBody>
+      </p:sp>
+    </p:spTree>
+    <p:extLst>
+      <p:ext uri="{BB962C8B-B14F-4D97-AF65-F5344CB8AC3E}">
+        <p14:creationId xmlns:p14="http://schemas.microsoft.com/office/powerpoint/2010/main" val="2638938662"/>
+      </p:ext>
+    </p:extLst>
+  </p:cSld>
+  <p:clrMapOvr>
+    <a:masterClrMapping/>
+  </p:clrMapOvr>
+</p:sld>
+</file>
+
 <file path=ppt/slides/slide2.xml><?xml version="1.0" encoding="utf-8"?>
 <p:sld xmlns:a="http://schemas.openxmlformats.org/drawingml/2006/main" xmlns:r="http://schemas.openxmlformats.org/officeDocument/2006/relationships" xmlns:p="http://schemas.openxmlformats.org/presentationml/2006/main">
   <p:cSld>
@@ -5265,6 +5357,374 @@
     <p:extLst>
       <p:ext uri="{BB962C8B-B14F-4D97-AF65-F5344CB8AC3E}">
         <p14:creationId xmlns:p14="http://schemas.microsoft.com/office/powerpoint/2010/main" val="148272130"/>
+      </p:ext>
+    </p:extLst>
+  </p:cSld>
+  <p:clrMapOvr>
+    <a:masterClrMapping/>
+  </p:clrMapOvr>
+</p:sld>
+</file>
+
+<file path=ppt/slides/slide20.xml><?xml version="1.0" encoding="utf-8"?>
+<p:sld xmlns:a="http://schemas.openxmlformats.org/drawingml/2006/main" xmlns:r="http://schemas.openxmlformats.org/officeDocument/2006/relationships" xmlns:p="http://schemas.openxmlformats.org/presentationml/2006/main">
+  <p:cSld>
+    <p:spTree>
+      <p:nvGrpSpPr>
+        <p:cNvPr id="1" name=""/>
+        <p:cNvGrpSpPr/>
+        <p:nvPr/>
+      </p:nvGrpSpPr>
+      <p:grpSpPr>
+        <a:xfrm>
+          <a:off x="0" y="0"/>
+          <a:ext cx="0" cy="0"/>
+          <a:chOff x="0" y="0"/>
+          <a:chExt cx="0" cy="0"/>
+        </a:xfrm>
+      </p:grpSpPr>
+      <p:pic>
+        <p:nvPicPr>
+          <p:cNvPr id="6" name="Picture 5" descr="Chart, line chart&#10;&#10;Description automatically generated">
+            <a:extLst>
+              <a:ext uri="{FF2B5EF4-FFF2-40B4-BE49-F238E27FC236}">
+                <a16:creationId xmlns:a16="http://schemas.microsoft.com/office/drawing/2014/main" id="{101365B1-0988-3F4F-8DE7-4FADE0EC6D1A}"/>
+              </a:ext>
+            </a:extLst>
+          </p:cNvPr>
+          <p:cNvPicPr>
+            <a:picLocks noChangeAspect="1"/>
+          </p:cNvPicPr>
+          <p:nvPr/>
+        </p:nvPicPr>
+        <p:blipFill>
+          <a:blip r:embed="rId2"/>
+          <a:stretch>
+            <a:fillRect/>
+          </a:stretch>
+        </p:blipFill>
+        <p:spPr>
+          <a:xfrm>
+            <a:off x="698500" y="1206500"/>
+            <a:ext cx="10795000" cy="4445000"/>
+          </a:xfrm>
+          <a:prstGeom prst="rect">
+            <a:avLst/>
+          </a:prstGeom>
+        </p:spPr>
+      </p:pic>
+    </p:spTree>
+    <p:extLst>
+      <p:ext uri="{BB962C8B-B14F-4D97-AF65-F5344CB8AC3E}">
+        <p14:creationId xmlns:p14="http://schemas.microsoft.com/office/powerpoint/2010/main" val="1018704990"/>
+      </p:ext>
+    </p:extLst>
+  </p:cSld>
+  <p:clrMapOvr>
+    <a:masterClrMapping/>
+  </p:clrMapOvr>
+</p:sld>
+</file>
+
+<file path=ppt/slides/slide21.xml><?xml version="1.0" encoding="utf-8"?>
+<p:sld xmlns:a="http://schemas.openxmlformats.org/drawingml/2006/main" xmlns:r="http://schemas.openxmlformats.org/officeDocument/2006/relationships" xmlns:p="http://schemas.openxmlformats.org/presentationml/2006/main">
+  <p:cSld>
+    <p:spTree>
+      <p:nvGrpSpPr>
+        <p:cNvPr id="1" name=""/>
+        <p:cNvGrpSpPr/>
+        <p:nvPr/>
+      </p:nvGrpSpPr>
+      <p:grpSpPr>
+        <a:xfrm>
+          <a:off x="0" y="0"/>
+          <a:ext cx="0" cy="0"/>
+          <a:chOff x="0" y="0"/>
+          <a:chExt cx="0" cy="0"/>
+        </a:xfrm>
+      </p:grpSpPr>
+      <p:pic>
+        <p:nvPicPr>
+          <p:cNvPr id="3" name="Picture 2" descr="Chart, scatter chart&#10;&#10;Description automatically generated">
+            <a:extLst>
+              <a:ext uri="{FF2B5EF4-FFF2-40B4-BE49-F238E27FC236}">
+                <a16:creationId xmlns:a16="http://schemas.microsoft.com/office/drawing/2014/main" id="{8AD0B8E4-A705-7349-88DC-9B5CC29096B3}"/>
+              </a:ext>
+            </a:extLst>
+          </p:cNvPr>
+          <p:cNvPicPr>
+            <a:picLocks noChangeAspect="1"/>
+          </p:cNvPicPr>
+          <p:nvPr/>
+        </p:nvPicPr>
+        <p:blipFill>
+          <a:blip r:embed="rId2"/>
+          <a:stretch>
+            <a:fillRect/>
+          </a:stretch>
+        </p:blipFill>
+        <p:spPr>
+          <a:xfrm>
+            <a:off x="2784584" y="448725"/>
+            <a:ext cx="6622832" cy="5960549"/>
+          </a:xfrm>
+          <a:prstGeom prst="rect">
+            <a:avLst/>
+          </a:prstGeom>
+        </p:spPr>
+      </p:pic>
+    </p:spTree>
+    <p:extLst>
+      <p:ext uri="{BB962C8B-B14F-4D97-AF65-F5344CB8AC3E}">
+        <p14:creationId xmlns:p14="http://schemas.microsoft.com/office/powerpoint/2010/main" val="2366463321"/>
+      </p:ext>
+    </p:extLst>
+  </p:cSld>
+  <p:clrMapOvr>
+    <a:masterClrMapping/>
+  </p:clrMapOvr>
+</p:sld>
+</file>
+
+<file path=ppt/slides/slide22.xml><?xml version="1.0" encoding="utf-8"?>
+<p:sld xmlns:a="http://schemas.openxmlformats.org/drawingml/2006/main" xmlns:r="http://schemas.openxmlformats.org/officeDocument/2006/relationships" xmlns:p="http://schemas.openxmlformats.org/presentationml/2006/main">
+  <p:cSld>
+    <p:spTree>
+      <p:nvGrpSpPr>
+        <p:cNvPr id="1" name=""/>
+        <p:cNvGrpSpPr/>
+        <p:nvPr/>
+      </p:nvGrpSpPr>
+      <p:grpSpPr>
+        <a:xfrm>
+          <a:off x="0" y="0"/>
+          <a:ext cx="0" cy="0"/>
+          <a:chOff x="0" y="0"/>
+          <a:chExt cx="0" cy="0"/>
+        </a:xfrm>
+      </p:grpSpPr>
+      <p:sp>
+        <p:nvSpPr>
+          <p:cNvPr id="2" name="Title 1">
+            <a:extLst>
+              <a:ext uri="{FF2B5EF4-FFF2-40B4-BE49-F238E27FC236}">
+                <a16:creationId xmlns:a16="http://schemas.microsoft.com/office/drawing/2014/main" id="{4988F265-3EA2-2C48-ADD8-7ADFED7634AA}"/>
+              </a:ext>
+            </a:extLst>
+          </p:cNvPr>
+          <p:cNvSpPr>
+            <a:spLocks noGrp="1"/>
+          </p:cNvSpPr>
+          <p:nvPr>
+            <p:ph type="title"/>
+          </p:nvPr>
+        </p:nvSpPr>
+        <p:spPr/>
+        <p:txBody>
+          <a:bodyPr/>
+          <a:lstStyle/>
+          <a:p>
+            <a:r>
+              <a:rPr lang="en-US" dirty="0"/>
+              <a:t>Exp 13: Spike Experiments</a:t>
+            </a:r>
+          </a:p>
+        </p:txBody>
+      </p:sp>
+      <p:sp>
+        <p:nvSpPr>
+          <p:cNvPr id="3" name="Text Placeholder 2">
+            <a:extLst>
+              <a:ext uri="{FF2B5EF4-FFF2-40B4-BE49-F238E27FC236}">
+                <a16:creationId xmlns:a16="http://schemas.microsoft.com/office/drawing/2014/main" id="{99B650ED-B940-904C-A259-8CC12C9C5227}"/>
+              </a:ext>
+            </a:extLst>
+          </p:cNvPr>
+          <p:cNvSpPr>
+            <a:spLocks noGrp="1"/>
+          </p:cNvSpPr>
+          <p:nvPr>
+            <p:ph type="body" idx="1"/>
+          </p:nvPr>
+        </p:nvSpPr>
+        <p:spPr/>
+        <p:txBody>
+          <a:bodyPr/>
+          <a:lstStyle/>
+          <a:p>
+            <a:r>
+              <a:rPr lang="en-US" dirty="0"/>
+              <a:t>20201106_exp13_gfp_spike</a:t>
+            </a:r>
+          </a:p>
+          <a:p>
+            <a:r>
+              <a:rPr lang="en-US" dirty="0"/>
+              <a:t>20201107_exp13_gfp_post_spike</a:t>
+            </a:r>
+          </a:p>
+          <a:p>
+            <a:endParaRPr lang="en-US" dirty="0"/>
+          </a:p>
+        </p:txBody>
+      </p:sp>
+    </p:spTree>
+    <p:extLst>
+      <p:ext uri="{BB962C8B-B14F-4D97-AF65-F5344CB8AC3E}">
+        <p14:creationId xmlns:p14="http://schemas.microsoft.com/office/powerpoint/2010/main" val="3340935602"/>
+      </p:ext>
+    </p:extLst>
+  </p:cSld>
+  <p:clrMapOvr>
+    <a:masterClrMapping/>
+  </p:clrMapOvr>
+</p:sld>
+</file>
+
+<file path=ppt/slides/slide23.xml><?xml version="1.0" encoding="utf-8"?>
+<p:sld xmlns:a="http://schemas.openxmlformats.org/drawingml/2006/main" xmlns:r="http://schemas.openxmlformats.org/officeDocument/2006/relationships" xmlns:p="http://schemas.openxmlformats.org/presentationml/2006/main">
+  <p:cSld>
+    <p:spTree>
+      <p:nvGrpSpPr>
+        <p:cNvPr id="1" name=""/>
+        <p:cNvGrpSpPr/>
+        <p:nvPr/>
+      </p:nvGrpSpPr>
+      <p:grpSpPr>
+        <a:xfrm>
+          <a:off x="0" y="0"/>
+          <a:ext cx="0" cy="0"/>
+          <a:chOff x="0" y="0"/>
+          <a:chExt cx="0" cy="0"/>
+        </a:xfrm>
+      </p:grpSpPr>
+      <p:sp>
+        <p:nvSpPr>
+          <p:cNvPr id="2" name="Title 1">
+            <a:extLst>
+              <a:ext uri="{FF2B5EF4-FFF2-40B4-BE49-F238E27FC236}">
+                <a16:creationId xmlns:a16="http://schemas.microsoft.com/office/drawing/2014/main" id="{9BBA4E7E-AD98-ED43-8F35-580F23D3E5B2}"/>
+              </a:ext>
+            </a:extLst>
+          </p:cNvPr>
+          <p:cNvSpPr>
+            <a:spLocks noGrp="1"/>
+          </p:cNvSpPr>
+          <p:nvPr>
+            <p:ph type="title"/>
+          </p:nvPr>
+        </p:nvSpPr>
+        <p:spPr>
+          <a:xfrm>
+            <a:off x="160282" y="0"/>
+            <a:ext cx="10515600" cy="1325563"/>
+          </a:xfrm>
+        </p:spPr>
+        <p:txBody>
+          <a:bodyPr>
+            <a:normAutofit/>
+          </a:bodyPr>
+          <a:lstStyle/>
+          <a:p>
+            <a:r>
+              <a:rPr lang="en-US" sz="3800" dirty="0"/>
+              <a:t>Pre Spike</a:t>
+            </a:r>
+          </a:p>
+        </p:txBody>
+      </p:sp>
+      <p:pic>
+        <p:nvPicPr>
+          <p:cNvPr id="6" name="Picture 5" descr="Chart&#10;&#10;Description automatically generated">
+            <a:extLst>
+              <a:ext uri="{FF2B5EF4-FFF2-40B4-BE49-F238E27FC236}">
+                <a16:creationId xmlns:a16="http://schemas.microsoft.com/office/drawing/2014/main" id="{ED45BC4D-093B-2B4D-94F8-02DBF6A684E3}"/>
+              </a:ext>
+            </a:extLst>
+          </p:cNvPr>
+          <p:cNvPicPr>
+            <a:picLocks noChangeAspect="1"/>
+          </p:cNvPicPr>
+          <p:nvPr/>
+        </p:nvPicPr>
+        <p:blipFill>
+          <a:blip r:embed="rId2"/>
+          <a:stretch>
+            <a:fillRect/>
+          </a:stretch>
+        </p:blipFill>
+        <p:spPr>
+          <a:xfrm>
+            <a:off x="698500" y="1206500"/>
+            <a:ext cx="10795000" cy="4445000"/>
+          </a:xfrm>
+          <a:prstGeom prst="rect">
+            <a:avLst/>
+          </a:prstGeom>
+        </p:spPr>
+      </p:pic>
+    </p:spTree>
+    <p:extLst>
+      <p:ext uri="{BB962C8B-B14F-4D97-AF65-F5344CB8AC3E}">
+        <p14:creationId xmlns:p14="http://schemas.microsoft.com/office/powerpoint/2010/main" val="2496250546"/>
+      </p:ext>
+    </p:extLst>
+  </p:cSld>
+  <p:clrMapOvr>
+    <a:masterClrMapping/>
+  </p:clrMapOvr>
+</p:sld>
+</file>
+
+<file path=ppt/slides/slide24.xml><?xml version="1.0" encoding="utf-8"?>
+<p:sld xmlns:a="http://schemas.openxmlformats.org/drawingml/2006/main" xmlns:r="http://schemas.openxmlformats.org/officeDocument/2006/relationships" xmlns:p="http://schemas.openxmlformats.org/presentationml/2006/main">
+  <p:cSld>
+    <p:spTree>
+      <p:nvGrpSpPr>
+        <p:cNvPr id="1" name=""/>
+        <p:cNvGrpSpPr/>
+        <p:nvPr/>
+      </p:nvGrpSpPr>
+      <p:grpSpPr>
+        <a:xfrm>
+          <a:off x="0" y="0"/>
+          <a:ext cx="0" cy="0"/>
+          <a:chOff x="0" y="0"/>
+          <a:chExt cx="0" cy="0"/>
+        </a:xfrm>
+      </p:grpSpPr>
+      <p:sp>
+        <p:nvSpPr>
+          <p:cNvPr id="2" name="Title 1">
+            <a:extLst>
+              <a:ext uri="{FF2B5EF4-FFF2-40B4-BE49-F238E27FC236}">
+                <a16:creationId xmlns:a16="http://schemas.microsoft.com/office/drawing/2014/main" id="{4A85FC60-10F6-DB40-A271-E4D7D9F15D5C}"/>
+              </a:ext>
+            </a:extLst>
+          </p:cNvPr>
+          <p:cNvSpPr>
+            <a:spLocks noGrp="1"/>
+          </p:cNvSpPr>
+          <p:nvPr>
+            <p:ph type="title"/>
+          </p:nvPr>
+        </p:nvSpPr>
+        <p:spPr/>
+        <p:txBody>
+          <a:bodyPr/>
+          <a:lstStyle/>
+          <a:p>
+            <a:r>
+              <a:rPr lang="en-US" dirty="0"/>
+              <a:t>Post Spike</a:t>
+            </a:r>
+          </a:p>
+        </p:txBody>
+      </p:sp>
+    </p:spTree>
+    <p:extLst>
+      <p:ext uri="{BB962C8B-B14F-4D97-AF65-F5344CB8AC3E}">
+        <p14:creationId xmlns:p14="http://schemas.microsoft.com/office/powerpoint/2010/main" val="600640930"/>
       </p:ext>
     </p:extLst>
   </p:cSld>

</xml_diff>